<commit_message>
splitClass - update documentation
</commit_message>
<xml_diff>
--- a/class_diagram.pptx
+++ b/class_diagram.pptx
@@ -198,7 +198,7 @@
           <a:p>
             <a:fld id="{8543C0F6-9420-A348-B989-152B43F49D8E}" type="datetimeFigureOut">
               <a:rPr lang="en-US" smtClean="0"/>
-              <a:t>12/17/21</a:t>
+              <a:t>12/21/21</a:t>
             </a:fld>
             <a:endParaRPr lang="en-US"/>
           </a:p>
@@ -680,7 +680,7 @@
           <a:p>
             <a:fld id="{7FA288A2-C145-9D48-B0F3-C3C049AE66AC}" type="datetimeFigureOut">
               <a:rPr lang="en-US" smtClean="0"/>
-              <a:t>12/17/21</a:t>
+              <a:t>12/21/21</a:t>
             </a:fld>
             <a:endParaRPr lang="en-US"/>
           </a:p>
@@ -850,7 +850,7 @@
           <a:p>
             <a:fld id="{7FA288A2-C145-9D48-B0F3-C3C049AE66AC}" type="datetimeFigureOut">
               <a:rPr lang="en-US" smtClean="0"/>
-              <a:t>12/17/21</a:t>
+              <a:t>12/21/21</a:t>
             </a:fld>
             <a:endParaRPr lang="en-US"/>
           </a:p>
@@ -1030,7 +1030,7 @@
           <a:p>
             <a:fld id="{7FA288A2-C145-9D48-B0F3-C3C049AE66AC}" type="datetimeFigureOut">
               <a:rPr lang="en-US" smtClean="0"/>
-              <a:t>12/17/21</a:t>
+              <a:t>12/21/21</a:t>
             </a:fld>
             <a:endParaRPr lang="en-US"/>
           </a:p>
@@ -1200,7 +1200,7 @@
           <a:p>
             <a:fld id="{7FA288A2-C145-9D48-B0F3-C3C049AE66AC}" type="datetimeFigureOut">
               <a:rPr lang="en-US" smtClean="0"/>
-              <a:t>12/17/21</a:t>
+              <a:t>12/21/21</a:t>
             </a:fld>
             <a:endParaRPr lang="en-US"/>
           </a:p>
@@ -1444,7 +1444,7 @@
           <a:p>
             <a:fld id="{7FA288A2-C145-9D48-B0F3-C3C049AE66AC}" type="datetimeFigureOut">
               <a:rPr lang="en-US" smtClean="0"/>
-              <a:t>12/17/21</a:t>
+              <a:t>12/21/21</a:t>
             </a:fld>
             <a:endParaRPr lang="en-US"/>
           </a:p>
@@ -1676,7 +1676,7 @@
           <a:p>
             <a:fld id="{7FA288A2-C145-9D48-B0F3-C3C049AE66AC}" type="datetimeFigureOut">
               <a:rPr lang="en-US" smtClean="0"/>
-              <a:t>12/17/21</a:t>
+              <a:t>12/21/21</a:t>
             </a:fld>
             <a:endParaRPr lang="en-US"/>
           </a:p>
@@ -2043,7 +2043,7 @@
           <a:p>
             <a:fld id="{7FA288A2-C145-9D48-B0F3-C3C049AE66AC}" type="datetimeFigureOut">
               <a:rPr lang="en-US" smtClean="0"/>
-              <a:t>12/17/21</a:t>
+              <a:t>12/21/21</a:t>
             </a:fld>
             <a:endParaRPr lang="en-US"/>
           </a:p>
@@ -2161,7 +2161,7 @@
           <a:p>
             <a:fld id="{7FA288A2-C145-9D48-B0F3-C3C049AE66AC}" type="datetimeFigureOut">
               <a:rPr lang="en-US" smtClean="0"/>
-              <a:t>12/17/21</a:t>
+              <a:t>12/21/21</a:t>
             </a:fld>
             <a:endParaRPr lang="en-US"/>
           </a:p>
@@ -2256,7 +2256,7 @@
           <a:p>
             <a:fld id="{7FA288A2-C145-9D48-B0F3-C3C049AE66AC}" type="datetimeFigureOut">
               <a:rPr lang="en-US" smtClean="0"/>
-              <a:t>12/17/21</a:t>
+              <a:t>12/21/21</a:t>
             </a:fld>
             <a:endParaRPr lang="en-US"/>
           </a:p>
@@ -2533,7 +2533,7 @@
           <a:p>
             <a:fld id="{7FA288A2-C145-9D48-B0F3-C3C049AE66AC}" type="datetimeFigureOut">
               <a:rPr lang="en-US" smtClean="0"/>
-              <a:t>12/17/21</a:t>
+              <a:t>12/21/21</a:t>
             </a:fld>
             <a:endParaRPr lang="en-US"/>
           </a:p>
@@ -2790,7 +2790,7 @@
           <a:p>
             <a:fld id="{7FA288A2-C145-9D48-B0F3-C3C049AE66AC}" type="datetimeFigureOut">
               <a:rPr lang="en-US" smtClean="0"/>
-              <a:t>12/17/21</a:t>
+              <a:t>12/21/21</a:t>
             </a:fld>
             <a:endParaRPr lang="en-US"/>
           </a:p>
@@ -3003,7 +3003,7 @@
           <a:p>
             <a:fld id="{7FA288A2-C145-9D48-B0F3-C3C049AE66AC}" type="datetimeFigureOut">
               <a:rPr lang="en-US" smtClean="0"/>
-              <a:t>12/17/21</a:t>
+              <a:t>12/21/21</a:t>
             </a:fld>
             <a:endParaRPr lang="en-US"/>
           </a:p>
@@ -6796,7 +6796,7 @@
           <a:p>
             <a:r>
               <a:rPr lang="en-US" sz="1350" dirty="0"/>
-              <a:t>1</a:t>
+              <a:t>2</a:t>
             </a:r>
           </a:p>
         </p:txBody>
@@ -15445,7 +15445,7 @@
             <a:pPr algn="r"/>
             <a:r>
               <a:rPr lang="en-US" sz="1350" dirty="0"/>
-              <a:t>1..n</a:t>
+              <a:t>4</a:t>
             </a:r>
           </a:p>
         </p:txBody>
@@ -15481,7 +15481,7 @@
             <a:pPr algn="r"/>
             <a:r>
               <a:rPr lang="en-US" sz="1350" dirty="0"/>
-              <a:t>1..n</a:t>
+              <a:t>4</a:t>
             </a:r>
           </a:p>
         </p:txBody>
@@ -15938,7 +15938,7 @@
             <a:pPr algn="r"/>
             <a:r>
               <a:rPr lang="en-US" sz="1350" dirty="0"/>
-              <a:t>1..n</a:t>
+              <a:t>3</a:t>
             </a:r>
           </a:p>
         </p:txBody>
@@ -15974,7 +15974,7 @@
             <a:pPr algn="r"/>
             <a:r>
               <a:rPr lang="en-US" sz="1350" dirty="0"/>
-              <a:t>1..n</a:t>
+              <a:t>3</a:t>
             </a:r>
           </a:p>
         </p:txBody>
@@ -20501,8 +20501,8 @@
         </p:nvSpPr>
         <p:spPr>
           <a:xfrm>
-            <a:off x="8327082" y="2001858"/>
-            <a:ext cx="3007127" cy="369332"/>
+            <a:off x="8327081" y="1750852"/>
+            <a:ext cx="3524251" cy="923330"/>
           </a:xfrm>
           <a:prstGeom prst="rect">
             <a:avLst/>
@@ -20521,7 +20521,23 @@
                   <a:schemeClr val="accent2"/>
                 </a:solidFill>
               </a:rPr>
-              <a:t>Main window container</a:t>
+              <a:t>Main window container + children configuration windows (Interval, Threshold, </a:t>
+            </a:r>
+            <a:r>
+              <a:rPr lang="en-US" dirty="0" err="1">
+                <a:solidFill>
+                  <a:schemeClr val="accent2"/>
+                </a:solidFill>
+              </a:rPr>
+              <a:t>YRange</a:t>
+            </a:r>
+            <a:r>
+              <a:rPr lang="en-US" dirty="0">
+                <a:solidFill>
+                  <a:schemeClr val="accent2"/>
+                </a:solidFill>
+              </a:rPr>
+              <a:t>)</a:t>
             </a:r>
           </a:p>
         </p:txBody>
@@ -20957,7 +20973,7 @@
         </p:nvSpPr>
         <p:spPr>
           <a:xfrm>
-            <a:off x="4892292" y="6790606"/>
+            <a:off x="4874154" y="6629145"/>
             <a:ext cx="449122" cy="1142554"/>
           </a:xfrm>
           <a:prstGeom prst="leftBrace">
@@ -21108,6 +21124,41 @@
           <a:p>
             <a:pPr algn="ctr"/>
             <a:endParaRPr lang="en-US"/>
+          </a:p>
+        </p:txBody>
+      </p:sp>
+      <p:sp>
+        <p:nvSpPr>
+          <p:cNvPr id="164" name="TextBox 163">
+            <a:extLst>
+              <a:ext uri="{FF2B5EF4-FFF2-40B4-BE49-F238E27FC236}">
+                <a16:creationId xmlns:a16="http://schemas.microsoft.com/office/drawing/2014/main" id="{A9133315-15DB-B346-8EAE-0A5ACCB85188}"/>
+              </a:ext>
+            </a:extLst>
+          </p:cNvPr>
+          <p:cNvSpPr txBox="1"/>
+          <p:nvPr/>
+        </p:nvSpPr>
+        <p:spPr>
+          <a:xfrm>
+            <a:off x="6371868" y="5576098"/>
+            <a:ext cx="265710" cy="300082"/>
+          </a:xfrm>
+          <a:prstGeom prst="rect">
+            <a:avLst/>
+          </a:prstGeom>
+          <a:noFill/>
+        </p:spPr>
+        <p:txBody>
+          <a:bodyPr wrap="square" rtlCol="0">
+            <a:spAutoFit/>
+          </a:bodyPr>
+          <a:lstStyle/>
+          <a:p>
+            <a:r>
+              <a:rPr lang="en-US" sz="1350" dirty="0"/>
+              <a:t>7</a:t>
+            </a:r>
           </a:p>
         </p:txBody>
       </p:sp>

</xml_diff>